<commit_message>
update the slides, README.md
</commit_message>
<xml_diff>
--- a/(2025.10.22) IntegraDev interview slides.pptx
+++ b/(2025.10.22) IntegraDev interview slides.pptx
@@ -13,6 +13,7 @@
     <p:sldId id="260" r:id="rId7"/>
     <p:sldId id="261" r:id="rId8"/>
     <p:sldId id="263" r:id="rId9"/>
+    <p:sldId id="264" r:id="rId10"/>
   </p:sldIdLst>
   <p:sldSz cx="12192000" cy="6858000"/>
   <p:notesSz cx="6858000" cy="9144000"/>
@@ -268,7 +269,7 @@
           <a:p>
             <a:fld id="{BD0CCAD3-995B-1349-87AC-3A83B70BB6A8}" type="datetimeFigureOut">
               <a:rPr lang="en-US" smtClean="0"/>
-              <a:t>10/16/25</a:t>
+              <a:t>10/19/25</a:t>
             </a:fld>
             <a:endParaRPr lang="en-US"/>
           </a:p>
@@ -468,7 +469,7 @@
           <a:p>
             <a:fld id="{BD0CCAD3-995B-1349-87AC-3A83B70BB6A8}" type="datetimeFigureOut">
               <a:rPr lang="en-US" smtClean="0"/>
-              <a:t>10/16/25</a:t>
+              <a:t>10/19/25</a:t>
             </a:fld>
             <a:endParaRPr lang="en-US"/>
           </a:p>
@@ -678,7 +679,7 @@
           <a:p>
             <a:fld id="{BD0CCAD3-995B-1349-87AC-3A83B70BB6A8}" type="datetimeFigureOut">
               <a:rPr lang="en-US" smtClean="0"/>
-              <a:t>10/16/25</a:t>
+              <a:t>10/19/25</a:t>
             </a:fld>
             <a:endParaRPr lang="en-US"/>
           </a:p>
@@ -878,7 +879,7 @@
           <a:p>
             <a:fld id="{BD0CCAD3-995B-1349-87AC-3A83B70BB6A8}" type="datetimeFigureOut">
               <a:rPr lang="en-US" smtClean="0"/>
-              <a:t>10/16/25</a:t>
+              <a:t>10/19/25</a:t>
             </a:fld>
             <a:endParaRPr lang="en-US"/>
           </a:p>
@@ -1154,7 +1155,7 @@
           <a:p>
             <a:fld id="{BD0CCAD3-995B-1349-87AC-3A83B70BB6A8}" type="datetimeFigureOut">
               <a:rPr lang="en-US" smtClean="0"/>
-              <a:t>10/16/25</a:t>
+              <a:t>10/19/25</a:t>
             </a:fld>
             <a:endParaRPr lang="en-US"/>
           </a:p>
@@ -1422,7 +1423,7 @@
           <a:p>
             <a:fld id="{BD0CCAD3-995B-1349-87AC-3A83B70BB6A8}" type="datetimeFigureOut">
               <a:rPr lang="en-US" smtClean="0"/>
-              <a:t>10/16/25</a:t>
+              <a:t>10/19/25</a:t>
             </a:fld>
             <a:endParaRPr lang="en-US"/>
           </a:p>
@@ -1837,7 +1838,7 @@
           <a:p>
             <a:fld id="{BD0CCAD3-995B-1349-87AC-3A83B70BB6A8}" type="datetimeFigureOut">
               <a:rPr lang="en-US" smtClean="0"/>
-              <a:t>10/16/25</a:t>
+              <a:t>10/19/25</a:t>
             </a:fld>
             <a:endParaRPr lang="en-US"/>
           </a:p>
@@ -1979,7 +1980,7 @@
           <a:p>
             <a:fld id="{BD0CCAD3-995B-1349-87AC-3A83B70BB6A8}" type="datetimeFigureOut">
               <a:rPr lang="en-US" smtClean="0"/>
-              <a:t>10/16/25</a:t>
+              <a:t>10/19/25</a:t>
             </a:fld>
             <a:endParaRPr lang="en-US"/>
           </a:p>
@@ -2092,7 +2093,7 @@
           <a:p>
             <a:fld id="{BD0CCAD3-995B-1349-87AC-3A83B70BB6A8}" type="datetimeFigureOut">
               <a:rPr lang="en-US" smtClean="0"/>
-              <a:t>10/16/25</a:t>
+              <a:t>10/19/25</a:t>
             </a:fld>
             <a:endParaRPr lang="en-US"/>
           </a:p>
@@ -2405,7 +2406,7 @@
           <a:p>
             <a:fld id="{BD0CCAD3-995B-1349-87AC-3A83B70BB6A8}" type="datetimeFigureOut">
               <a:rPr lang="en-US" smtClean="0"/>
-              <a:t>10/16/25</a:t>
+              <a:t>10/19/25</a:t>
             </a:fld>
             <a:endParaRPr lang="en-US"/>
           </a:p>
@@ -2694,7 +2695,7 @@
           <a:p>
             <a:fld id="{BD0CCAD3-995B-1349-87AC-3A83B70BB6A8}" type="datetimeFigureOut">
               <a:rPr lang="en-US" smtClean="0"/>
-              <a:t>10/16/25</a:t>
+              <a:t>10/19/25</a:t>
             </a:fld>
             <a:endParaRPr lang="en-US"/>
           </a:p>
@@ -2937,7 +2938,7 @@
           <a:p>
             <a:fld id="{BD0CCAD3-995B-1349-87AC-3A83B70BB6A8}" type="datetimeFigureOut">
               <a:rPr lang="en-US" smtClean="0"/>
-              <a:t>10/16/25</a:t>
+              <a:t>10/19/25</a:t>
             </a:fld>
             <a:endParaRPr lang="en-US"/>
           </a:p>
@@ -3904,6 +3905,36 @@
           </a:p>
         </p:txBody>
       </p:sp>
+      <p:pic>
+        <p:nvPicPr>
+          <p:cNvPr id="5" name="Picture 4" descr="A diagram of a application layering&#10;&#10;AI-generated content may be incorrect.">
+            <a:extLst>
+              <a:ext uri="{FF2B5EF4-FFF2-40B4-BE49-F238E27FC236}">
+                <a16:creationId xmlns:a16="http://schemas.microsoft.com/office/drawing/2014/main" id="{3A1C9F3E-AE05-5ABA-71A3-6B88D16A5836}"/>
+              </a:ext>
+            </a:extLst>
+          </p:cNvPr>
+          <p:cNvPicPr>
+            <a:picLocks noChangeAspect="1"/>
+          </p:cNvPicPr>
+          <p:nvPr/>
+        </p:nvPicPr>
+        <p:blipFill>
+          <a:blip r:embed="rId3"/>
+          <a:stretch>
+            <a:fillRect/>
+          </a:stretch>
+        </p:blipFill>
+        <p:spPr>
+          <a:xfrm>
+            <a:off x="838200" y="2519363"/>
+            <a:ext cx="4483100" cy="3238500"/>
+          </a:xfrm>
+          <a:prstGeom prst="rect">
+            <a:avLst/>
+          </a:prstGeom>
+        </p:spPr>
+      </p:pic>
     </p:spTree>
     <p:extLst>
       <p:ext uri="{BB962C8B-B14F-4D97-AF65-F5344CB8AC3E}">
@@ -4004,6 +4035,20 @@
               <a:t> – simple &amp; compatible with SQLite</a:t>
             </a:r>
           </a:p>
+          <a:p>
+            <a:r>
+              <a:rPr lang="en-US" dirty="0"/>
+              <a:t>Have the task table ready for some </a:t>
+            </a:r>
+            <a:r>
+              <a:rPr lang="en-US" dirty="0" err="1"/>
+              <a:t>intial</a:t>
+            </a:r>
+            <a:r>
+              <a:rPr lang="en-US" dirty="0"/>
+              <a:t> flow development</a:t>
+            </a:r>
+          </a:p>
         </p:txBody>
       </p:sp>
     </p:spTree>
@@ -4085,7 +4130,16 @@
           <a:bodyPr/>
           <a:lstStyle/>
           <a:p>
-            <a:endParaRPr lang="en-US" dirty="0"/>
+            <a:r>
+              <a:rPr lang="en-US" dirty="0"/>
+              <a:t>Was quite a challenge when using IntelliJ to build</a:t>
+            </a:r>
+          </a:p>
+          <a:p>
+            <a:r>
+              <a:rPr lang="en-US" dirty="0"/>
+              <a:t>Had to switch back to Maven and set up everything again</a:t>
+            </a:r>
           </a:p>
         </p:txBody>
       </p:sp>
@@ -4147,35 +4201,155 @@
           </a:p>
         </p:txBody>
       </p:sp>
-      <p:sp>
-        <p:nvSpPr>
-          <p:cNvPr id="3" name="Content Placeholder 2">
-            <a:extLst>
-              <a:ext uri="{FF2B5EF4-FFF2-40B4-BE49-F238E27FC236}">
-                <a16:creationId xmlns:a16="http://schemas.microsoft.com/office/drawing/2014/main" id="{7BF45ED8-069D-EA57-94C7-0FA04C1E20CE}"/>
-              </a:ext>
-            </a:extLst>
-          </p:cNvPr>
-          <p:cNvSpPr>
-            <a:spLocks noGrp="1"/>
-          </p:cNvSpPr>
+      <p:pic>
+        <p:nvPicPr>
+          <p:cNvPr id="5" name="Content Placeholder 4" descr="A screenshot of a calendar&#10;&#10;AI-generated content may be incorrect.">
+            <a:extLst>
+              <a:ext uri="{FF2B5EF4-FFF2-40B4-BE49-F238E27FC236}">
+                <a16:creationId xmlns:a16="http://schemas.microsoft.com/office/drawing/2014/main" id="{4A8F5AED-AA9C-C4EA-5A98-EBEE56EAC52C}"/>
+              </a:ext>
+            </a:extLst>
+          </p:cNvPr>
+          <p:cNvPicPr>
+            <a:picLocks noGrp="1" noChangeAspect="1"/>
+          </p:cNvPicPr>
           <p:nvPr>
             <p:ph idx="1"/>
           </p:nvPr>
-        </p:nvSpPr>
-        <p:spPr/>
-        <p:txBody>
-          <a:bodyPr/>
-          <a:lstStyle/>
-          <a:p>
-            <a:endParaRPr lang="en-US"/>
-          </a:p>
-        </p:txBody>
-      </p:sp>
+        </p:nvPicPr>
+        <p:blipFill>
+          <a:blip r:embed="rId2"/>
+          <a:stretch>
+            <a:fillRect/>
+          </a:stretch>
+        </p:blipFill>
+        <p:spPr>
+          <a:xfrm>
+            <a:off x="2841130" y="1825625"/>
+            <a:ext cx="6509739" cy="4351338"/>
+          </a:xfrm>
+        </p:spPr>
+      </p:pic>
     </p:spTree>
     <p:extLst>
       <p:ext uri="{BB962C8B-B14F-4D97-AF65-F5344CB8AC3E}">
         <p14:creationId xmlns:p14="http://schemas.microsoft.com/office/powerpoint/2010/main" val="2381812237"/>
+      </p:ext>
+    </p:extLst>
+  </p:cSld>
+  <p:clrMapOvr>
+    <a:masterClrMapping/>
+  </p:clrMapOvr>
+</p:sld>
+</file>
+
+<file path=ppt/slides/slide9.xml><?xml version="1.0" encoding="utf-8"?>
+<p:sld xmlns:a="http://schemas.openxmlformats.org/drawingml/2006/main" xmlns:r="http://schemas.openxmlformats.org/officeDocument/2006/relationships" xmlns:p="http://schemas.openxmlformats.org/presentationml/2006/main">
+  <p:cSld>
+    <p:spTree>
+      <p:nvGrpSpPr>
+        <p:cNvPr id="1" name=""/>
+        <p:cNvGrpSpPr/>
+        <p:nvPr/>
+      </p:nvGrpSpPr>
+      <p:grpSpPr>
+        <a:xfrm>
+          <a:off x="0" y="0"/>
+          <a:ext cx="0" cy="0"/>
+          <a:chOff x="0" y="0"/>
+          <a:chExt cx="0" cy="0"/>
+        </a:xfrm>
+      </p:grpSpPr>
+      <p:sp>
+        <p:nvSpPr>
+          <p:cNvPr id="2" name="Title 1">
+            <a:extLst>
+              <a:ext uri="{FF2B5EF4-FFF2-40B4-BE49-F238E27FC236}">
+                <a16:creationId xmlns:a16="http://schemas.microsoft.com/office/drawing/2014/main" id="{6CB7DD6F-FE7E-D17B-1402-7D271626D3C7}"/>
+              </a:ext>
+            </a:extLst>
+          </p:cNvPr>
+          <p:cNvSpPr>
+            <a:spLocks noGrp="1"/>
+          </p:cNvSpPr>
+          <p:nvPr>
+            <p:ph type="title"/>
+          </p:nvPr>
+        </p:nvSpPr>
+        <p:spPr/>
+        <p:txBody>
+          <a:bodyPr/>
+          <a:lstStyle/>
+          <a:p>
+            <a:r>
+              <a:rPr lang="en-US" dirty="0"/>
+              <a:t>Domain design</a:t>
+            </a:r>
+          </a:p>
+        </p:txBody>
+      </p:sp>
+      <p:sp>
+        <p:nvSpPr>
+          <p:cNvPr id="3" name="Content Placeholder 2">
+            <a:extLst>
+              <a:ext uri="{FF2B5EF4-FFF2-40B4-BE49-F238E27FC236}">
+                <a16:creationId xmlns:a16="http://schemas.microsoft.com/office/drawing/2014/main" id="{CAE47F2D-9A05-A4C3-EB43-F77F1CB18D20}"/>
+              </a:ext>
+            </a:extLst>
+          </p:cNvPr>
+          <p:cNvSpPr>
+            <a:spLocks noGrp="1"/>
+          </p:cNvSpPr>
+          <p:nvPr>
+            <p:ph idx="1"/>
+          </p:nvPr>
+        </p:nvSpPr>
+        <p:spPr/>
+        <p:txBody>
+          <a:bodyPr/>
+          <a:lstStyle/>
+          <a:p>
+            <a:r>
+              <a:rPr lang="en-US" dirty="0"/>
+              <a:t>Focus: to enable the planning algorithms to be evolved</a:t>
+            </a:r>
+          </a:p>
+        </p:txBody>
+      </p:sp>
+      <p:pic>
+        <p:nvPicPr>
+          <p:cNvPr id="5" name="Picture 4" descr="A screenshot of a computer&#10;&#10;AI-generated content may be incorrect.">
+            <a:extLst>
+              <a:ext uri="{FF2B5EF4-FFF2-40B4-BE49-F238E27FC236}">
+                <a16:creationId xmlns:a16="http://schemas.microsoft.com/office/drawing/2014/main" id="{E83E88C7-3874-5202-4ED1-CFB049074F63}"/>
+              </a:ext>
+            </a:extLst>
+          </p:cNvPr>
+          <p:cNvPicPr>
+            <a:picLocks noChangeAspect="1"/>
+          </p:cNvPicPr>
+          <p:nvPr/>
+        </p:nvPicPr>
+        <p:blipFill>
+          <a:blip r:embed="rId2"/>
+          <a:stretch>
+            <a:fillRect/>
+          </a:stretch>
+        </p:blipFill>
+        <p:spPr>
+          <a:xfrm>
+            <a:off x="970869" y="2398194"/>
+            <a:ext cx="7772400" cy="4379139"/>
+          </a:xfrm>
+          <a:prstGeom prst="rect">
+            <a:avLst/>
+          </a:prstGeom>
+        </p:spPr>
+      </p:pic>
+    </p:spTree>
+    <p:extLst>
+      <p:ext uri="{BB962C8B-B14F-4D97-AF65-F5344CB8AC3E}">
+        <p14:creationId xmlns:p14="http://schemas.microsoft.com/office/powerpoint/2010/main" val="3503383913"/>
       </p:ext>
     </p:extLst>
   </p:cSld>

</xml_diff>